<commit_message>
Functional Status GUI + Data Sending
Added status GUI and data sending between HTML
</commit_message>
<xml_diff>
--- a/Assets/GUIMaker.pptx
+++ b/Assets/GUIMaker.pptx
@@ -104,6 +104,11 @@
       </a:defRPr>
     </a:lvl9pPr>
   </p:defaultTextStyle>
+  <p:extLst>
+    <p:ext uri="{EFAFB233-063F-42B5-8137-9DF3F51BA10A}">
+      <p15:sldGuideLst xmlns:p15="http://schemas.microsoft.com/office/powerpoint/2012/main"/>
+    </p:ext>
+  </p:extLst>
 </p:presentation>
 </file>
 
@@ -238,7 +243,7 @@
           <a:p>
             <a:fld id="{5186A271-101F-4150-B61D-6AB6DF8DF409}" type="datetimeFigureOut">
               <a:rPr lang="en-GB" smtClean="0"/>
-              <a:t>08/04/2025</a:t>
+              <a:t>09/04/2025</a:t>
             </a:fld>
             <a:endParaRPr lang="en-GB"/>
           </a:p>
@@ -408,7 +413,7 @@
           <a:p>
             <a:fld id="{5186A271-101F-4150-B61D-6AB6DF8DF409}" type="datetimeFigureOut">
               <a:rPr lang="en-GB" smtClean="0"/>
-              <a:t>08/04/2025</a:t>
+              <a:t>09/04/2025</a:t>
             </a:fld>
             <a:endParaRPr lang="en-GB"/>
           </a:p>
@@ -588,7 +593,7 @@
           <a:p>
             <a:fld id="{5186A271-101F-4150-B61D-6AB6DF8DF409}" type="datetimeFigureOut">
               <a:rPr lang="en-GB" smtClean="0"/>
-              <a:t>08/04/2025</a:t>
+              <a:t>09/04/2025</a:t>
             </a:fld>
             <a:endParaRPr lang="en-GB"/>
           </a:p>
@@ -758,7 +763,7 @@
           <a:p>
             <a:fld id="{5186A271-101F-4150-B61D-6AB6DF8DF409}" type="datetimeFigureOut">
               <a:rPr lang="en-GB" smtClean="0"/>
-              <a:t>08/04/2025</a:t>
+              <a:t>09/04/2025</a:t>
             </a:fld>
             <a:endParaRPr lang="en-GB"/>
           </a:p>
@@ -1004,7 +1009,7 @@
           <a:p>
             <a:fld id="{5186A271-101F-4150-B61D-6AB6DF8DF409}" type="datetimeFigureOut">
               <a:rPr lang="en-GB" smtClean="0"/>
-              <a:t>08/04/2025</a:t>
+              <a:t>09/04/2025</a:t>
             </a:fld>
             <a:endParaRPr lang="en-GB"/>
           </a:p>
@@ -1236,7 +1241,7 @@
           <a:p>
             <a:fld id="{5186A271-101F-4150-B61D-6AB6DF8DF409}" type="datetimeFigureOut">
               <a:rPr lang="en-GB" smtClean="0"/>
-              <a:t>08/04/2025</a:t>
+              <a:t>09/04/2025</a:t>
             </a:fld>
             <a:endParaRPr lang="en-GB"/>
           </a:p>
@@ -1603,7 +1608,7 @@
           <a:p>
             <a:fld id="{5186A271-101F-4150-B61D-6AB6DF8DF409}" type="datetimeFigureOut">
               <a:rPr lang="en-GB" smtClean="0"/>
-              <a:t>08/04/2025</a:t>
+              <a:t>09/04/2025</a:t>
             </a:fld>
             <a:endParaRPr lang="en-GB"/>
           </a:p>
@@ -1721,7 +1726,7 @@
           <a:p>
             <a:fld id="{5186A271-101F-4150-B61D-6AB6DF8DF409}" type="datetimeFigureOut">
               <a:rPr lang="en-GB" smtClean="0"/>
-              <a:t>08/04/2025</a:t>
+              <a:t>09/04/2025</a:t>
             </a:fld>
             <a:endParaRPr lang="en-GB"/>
           </a:p>
@@ -1816,7 +1821,7 @@
           <a:p>
             <a:fld id="{5186A271-101F-4150-B61D-6AB6DF8DF409}" type="datetimeFigureOut">
               <a:rPr lang="en-GB" smtClean="0"/>
-              <a:t>08/04/2025</a:t>
+              <a:t>09/04/2025</a:t>
             </a:fld>
             <a:endParaRPr lang="en-GB"/>
           </a:p>
@@ -2093,7 +2098,7 @@
           <a:p>
             <a:fld id="{5186A271-101F-4150-B61D-6AB6DF8DF409}" type="datetimeFigureOut">
               <a:rPr lang="en-GB" smtClean="0"/>
-              <a:t>08/04/2025</a:t>
+              <a:t>09/04/2025</a:t>
             </a:fld>
             <a:endParaRPr lang="en-GB"/>
           </a:p>
@@ -2346,7 +2351,7 @@
           <a:p>
             <a:fld id="{5186A271-101F-4150-B61D-6AB6DF8DF409}" type="datetimeFigureOut">
               <a:rPr lang="en-GB" smtClean="0"/>
-              <a:t>08/04/2025</a:t>
+              <a:t>09/04/2025</a:t>
             </a:fld>
             <a:endParaRPr lang="en-GB"/>
           </a:p>
@@ -2559,7 +2564,7 @@
           <a:p>
             <a:fld id="{5186A271-101F-4150-B61D-6AB6DF8DF409}" type="datetimeFigureOut">
               <a:rPr lang="en-GB" smtClean="0"/>
-              <a:t>08/04/2025</a:t>
+              <a:t>09/04/2025</a:t>
             </a:fld>
             <a:endParaRPr lang="en-GB"/>
           </a:p>
@@ -2966,36 +2971,6 @@
       </p:grpSpPr>
       <p:pic>
         <p:nvPicPr>
-          <p:cNvPr id="42" name="Picture 41"/>
-          <p:cNvPicPr>
-            <a:picLocks noChangeAspect="1"/>
-          </p:cNvPicPr>
-          <p:nvPr/>
-        </p:nvPicPr>
-        <p:blipFill>
-          <a:blip r:embed="rId2">
-            <a:extLst>
-              <a:ext uri="{28A0092B-C50C-407E-A947-70E740481C1C}">
-                <a14:useLocalDpi xmlns:a14="http://schemas.microsoft.com/office/drawing/2010/main" val="0"/>
-              </a:ext>
-            </a:extLst>
-          </a:blip>
-          <a:stretch>
-            <a:fillRect/>
-          </a:stretch>
-        </p:blipFill>
-        <p:spPr>
-          <a:xfrm>
-            <a:off x="4402850" y="2264583"/>
-            <a:ext cx="3600557" cy="741696"/>
-          </a:xfrm>
-          <a:prstGeom prst="rect">
-            <a:avLst/>
-          </a:prstGeom>
-        </p:spPr>
-      </p:pic>
-      <p:pic>
-        <p:nvPicPr>
           <p:cNvPr id="7" name="Picture 6"/>
           <p:cNvPicPr>
             <a:picLocks noChangeAspect="1"/>
@@ -3257,64 +3232,6 @@
       </p:pic>
       <p:pic>
         <p:nvPicPr>
-          <p:cNvPr id="6" name="Picture 5"/>
-          <p:cNvPicPr>
-            <a:picLocks noChangeAspect="1"/>
-          </p:cNvPicPr>
-          <p:nvPr/>
-        </p:nvPicPr>
-        <p:blipFill>
-          <a:blip r:embed="rId11">
-            <a:extLst>
-              <a:ext uri="{BEBA8EAE-BF5A-486C-A8C5-ECC9F3942E4B}">
-                <a14:imgProps xmlns:a14="http://schemas.microsoft.com/office/drawing/2010/main">
-                  <a14:imgLayer r:embed="rId9">
-                    <a14:imgEffect>
-                      <a14:backgroundRemoval t="0" b="100000" l="0" r="100000">
-                        <a14:foregroundMark x1="12371" y1="24490" x2="5155" y2="24490"/>
-                        <a14:foregroundMark x1="22680" y1="14286" x2="47423" y2="3061"/>
-                        <a14:foregroundMark x1="50515" y1="15306" x2="76289" y2="13265"/>
-                        <a14:foregroundMark x1="73196" y1="6122" x2="98969" y2="33673"/>
-                        <a14:foregroundMark x1="88660" y1="21429" x2="93814" y2="66327"/>
-                        <a14:foregroundMark x1="89691" y1="63265" x2="85567" y2="92857"/>
-                        <a14:foregroundMark x1="73196" y1="89796" x2="41237" y2="97959"/>
-                        <a14:foregroundMark x1="46392" y1="93878" x2="11340" y2="92857"/>
-                        <a14:foregroundMark x1="25773" y1="86735" x2="2062" y2="61224"/>
-                        <a14:foregroundMark x1="21649" y1="23469" x2="31959" y2="2041"/>
-                        <a14:foregroundMark x1="16495" y1="21429" x2="14433" y2="6122"/>
-                        <a14:backgroundMark x1="27835" y1="30612" x2="51546" y2="69388"/>
-                        <a14:backgroundMark x1="62887" y1="33673" x2="76289" y2="57143"/>
-                        <a14:backgroundMark x1="67010" y1="40816" x2="60825" y2="66327"/>
-                        <a14:backgroundMark x1="37113" y1="46939" x2="37113" y2="47959"/>
-                      </a14:backgroundRemoval>
-                    </a14:imgEffect>
-                    <a14:imgEffect>
-                      <a14:artisticPlasticWrap/>
-                    </a14:imgEffect>
-                  </a14:imgLayer>
-                </a14:imgProps>
-              </a:ext>
-              <a:ext uri="{28A0092B-C50C-407E-A947-70E740481C1C}">
-                <a14:useLocalDpi xmlns:a14="http://schemas.microsoft.com/office/drawing/2010/main" val="0"/>
-              </a:ext>
-            </a:extLst>
-          </a:blip>
-          <a:stretch>
-            <a:fillRect/>
-          </a:stretch>
-        </p:blipFill>
-        <p:spPr>
-          <a:xfrm>
-            <a:off x="57800" y="58598"/>
-            <a:ext cx="2150888" cy="2173062"/>
-          </a:xfrm>
-          <a:prstGeom prst="rect">
-            <a:avLst/>
-          </a:prstGeom>
-        </p:spPr>
-      </p:pic>
-      <p:pic>
-        <p:nvPicPr>
           <p:cNvPr id="16" name="Picture 15"/>
           <p:cNvPicPr>
             <a:picLocks noChangeAspect="1"/>
@@ -3424,6 +3341,44 @@
           <p:nvPr/>
         </p:nvPicPr>
         <p:blipFill>
+          <a:blip r:embed="rId11">
+            <a:extLst>
+              <a:ext uri="{28A0092B-C50C-407E-A947-70E740481C1C}">
+                <a14:useLocalDpi xmlns:a14="http://schemas.microsoft.com/office/drawing/2010/main" val="0"/>
+              </a:ext>
+            </a:extLst>
+          </a:blip>
+          <a:stretch>
+            <a:fillRect/>
+          </a:stretch>
+        </p:blipFill>
+        <p:spPr>
+          <a:xfrm>
+            <a:off x="1402794" y="4792214"/>
+            <a:ext cx="425066" cy="372653"/>
+          </a:xfrm>
+          <a:prstGeom prst="rect">
+            <a:avLst/>
+          </a:prstGeom>
+          <a:effectLst>
+            <a:outerShdw blurRad="50800" dist="38100" dir="5400000" algn="t" rotWithShape="0">
+              <a:prstClr val="black">
+                <a:alpha val="40000"/>
+              </a:prstClr>
+            </a:outerShdw>
+            <a:softEdge rad="31750"/>
+          </a:effectLst>
+        </p:spPr>
+      </p:pic>
+      <p:pic>
+        <p:nvPicPr>
+          <p:cNvPr id="20" name="Picture 19"/>
+          <p:cNvPicPr>
+            <a:picLocks noChangeAspect="1"/>
+          </p:cNvPicPr>
+          <p:nvPr/>
+        </p:nvPicPr>
+        <p:blipFill>
           <a:blip r:embed="rId12">
             <a:extLst>
               <a:ext uri="{28A0092B-C50C-407E-A947-70E740481C1C}">
@@ -3437,7 +3392,7 @@
         </p:blipFill>
         <p:spPr>
           <a:xfrm>
-            <a:off x="1402794" y="4792214"/>
+            <a:off x="962940" y="4805320"/>
             <a:ext cx="425066" cy="372653"/>
           </a:xfrm>
           <a:prstGeom prst="rect">
@@ -3455,7 +3410,7 @@
       </p:pic>
       <p:pic>
         <p:nvPicPr>
-          <p:cNvPr id="20" name="Picture 19"/>
+          <p:cNvPr id="21" name="Picture 20"/>
           <p:cNvPicPr>
             <a:picLocks noChangeAspect="1"/>
           </p:cNvPicPr>
@@ -3463,44 +3418,6 @@
         </p:nvPicPr>
         <p:blipFill>
           <a:blip r:embed="rId13">
-            <a:extLst>
-              <a:ext uri="{28A0092B-C50C-407E-A947-70E740481C1C}">
-                <a14:useLocalDpi xmlns:a14="http://schemas.microsoft.com/office/drawing/2010/main" val="0"/>
-              </a:ext>
-            </a:extLst>
-          </a:blip>
-          <a:stretch>
-            <a:fillRect/>
-          </a:stretch>
-        </p:blipFill>
-        <p:spPr>
-          <a:xfrm>
-            <a:off x="962940" y="4805320"/>
-            <a:ext cx="425066" cy="372653"/>
-          </a:xfrm>
-          <a:prstGeom prst="rect">
-            <a:avLst/>
-          </a:prstGeom>
-          <a:effectLst>
-            <a:outerShdw blurRad="50800" dist="38100" dir="5400000" algn="t" rotWithShape="0">
-              <a:prstClr val="black">
-                <a:alpha val="40000"/>
-              </a:prstClr>
-            </a:outerShdw>
-            <a:softEdge rad="31750"/>
-          </a:effectLst>
-        </p:spPr>
-      </p:pic>
-      <p:pic>
-        <p:nvPicPr>
-          <p:cNvPr id="21" name="Picture 20"/>
-          <p:cNvPicPr>
-            <a:picLocks noChangeAspect="1"/>
-          </p:cNvPicPr>
-          <p:nvPr/>
-        </p:nvPicPr>
-        <p:blipFill>
-          <a:blip r:embed="rId14">
             <a:extLst>
               <a:ext uri="{28A0092B-C50C-407E-A947-70E740481C1C}">
                 <a14:useLocalDpi xmlns:a14="http://schemas.microsoft.com/office/drawing/2010/main" val="0"/>
@@ -3640,7 +3557,7 @@
           <p:nvPr/>
         </p:nvPicPr>
         <p:blipFill>
-          <a:blip r:embed="rId15" cstate="print">
+          <a:blip r:embed="rId14" cstate="print">
             <a:extLst>
               <a:ext uri="{28A0092B-C50C-407E-A947-70E740481C1C}">
                 <a14:useLocalDpi xmlns:a14="http://schemas.microsoft.com/office/drawing/2010/main" val="0"/>
@@ -3780,7 +3697,7 @@
           <p:nvPr/>
         </p:nvPicPr>
         <p:blipFill rotWithShape="1">
-          <a:blip r:embed="rId16" cstate="print">
+          <a:blip r:embed="rId15" cstate="print">
             <a:duotone>
               <a:prstClr val="black"/>
               <a:schemeClr val="accent1">
@@ -3791,7 +3708,7 @@
             <a:extLst>
               <a:ext uri="{BEBA8EAE-BF5A-486C-A8C5-ECC9F3942E4B}">
                 <a14:imgProps xmlns:a14="http://schemas.microsoft.com/office/drawing/2010/main">
-                  <a14:imgLayer r:embed="rId17">
+                  <a14:imgLayer r:embed="rId16">
                     <a14:imgEffect>
                       <a14:backgroundRemoval t="10000" b="90000" l="10000" r="90000"/>
                     </a14:imgEffect>
@@ -3943,12 +3860,12 @@
           </p:cNvPicPr>
           <p:nvPr/>
         </p:nvPicPr>
-        <p:blipFill>
-          <a:blip r:embed="rId18" cstate="print">
+        <p:blipFill rotWithShape="1">
+          <a:blip r:embed="rId17" cstate="print">
             <a:extLst>
               <a:ext uri="{BEBA8EAE-BF5A-486C-A8C5-ECC9F3942E4B}">
                 <a14:imgProps xmlns:a14="http://schemas.microsoft.com/office/drawing/2010/main">
-                  <a14:imgLayer r:embed="rId19">
+                  <a14:imgLayer r:embed="rId18">
                     <a14:imgEffect>
                       <a14:backgroundRemoval t="10000" b="90000" l="10000" r="90000">
                         <a14:foregroundMark x1="45385" y1="64643" x2="45385" y2="64643"/>
@@ -3964,15 +3881,13 @@
               </a:ext>
             </a:extLst>
           </a:blip>
-          <a:srcRect/>
-          <a:stretch>
-            <a:fillRect/>
-          </a:stretch>
+          <a:srcRect l="21306" t="10629" r="19195" b="18402"/>
+          <a:stretch/>
         </p:blipFill>
         <p:spPr bwMode="auto">
           <a:xfrm>
-            <a:off x="436875" y="5533819"/>
-            <a:ext cx="661688" cy="688967"/>
+            <a:off x="577850" y="5607050"/>
+            <a:ext cx="393700" cy="488950"/>
           </a:xfrm>
           <a:prstGeom prst="rect">
             <a:avLst/>
@@ -4050,22 +3965,263 @@
         </p:blipFill>
         <p:spPr>
           <a:xfrm>
-            <a:off x="4480668" y="2396651"/>
-            <a:ext cx="3444919" cy="565844"/>
+            <a:off x="4464340" y="3585078"/>
+            <a:ext cx="3414196" cy="565844"/>
           </a:xfrm>
           <a:prstGeom prst="rect">
             <a:avLst/>
           </a:prstGeom>
-          <a:effectLst>
-            <a:reflection blurRad="6350" stA="52000" endA="300" endPos="35000" dir="5400000" sy="-100000" algn="bl" rotWithShape="0"/>
-          </a:effectLst>
+          <a:effectLst/>
           <a:scene3d>
             <a:camera prst="orthographicFront"/>
             <a:lightRig rig="threePt" dir="t"/>
           </a:scene3d>
           <a:sp3d>
-            <a:bevelT w="139700" h="139700" prst="divot"/>
+            <a:bevelT w="165100" prst="coolSlant"/>
           </a:sp3d>
+        </p:spPr>
+      </p:pic>
+      <p:sp>
+        <p:nvSpPr>
+          <p:cNvPr id="3" name="Rounded Rectangle 2"/>
+          <p:cNvSpPr/>
+          <p:nvPr/>
+        </p:nvSpPr>
+        <p:spPr>
+          <a:xfrm>
+            <a:off x="4523014" y="2486369"/>
+            <a:ext cx="3355522" cy="216010"/>
+          </a:xfrm>
+          <a:prstGeom prst="roundRect">
+            <a:avLst/>
+          </a:prstGeom>
+          <a:gradFill flip="none" rotWithShape="1">
+            <a:gsLst>
+              <a:gs pos="0">
+                <a:schemeClr val="accent3">
+                  <a:tint val="66000"/>
+                  <a:satMod val="160000"/>
+                </a:schemeClr>
+              </a:gs>
+              <a:gs pos="50000">
+                <a:schemeClr val="accent3">
+                  <a:tint val="44500"/>
+                  <a:satMod val="160000"/>
+                </a:schemeClr>
+              </a:gs>
+              <a:gs pos="100000">
+                <a:schemeClr val="accent3">
+                  <a:tint val="23500"/>
+                  <a:satMod val="160000"/>
+                </a:schemeClr>
+              </a:gs>
+            </a:gsLst>
+            <a:path path="circle">
+              <a:fillToRect l="50000" t="50000" r="50000" b="50000"/>
+            </a:path>
+            <a:tileRect/>
+          </a:gradFill>
+          <a:ln>
+            <a:noFill/>
+          </a:ln>
+          <a:effectLst>
+            <a:innerShdw blurRad="114300">
+              <a:prstClr val="black"/>
+            </a:innerShdw>
+          </a:effectLst>
+          <a:scene3d>
+            <a:camera prst="orthographicFront">
+              <a:rot lat="0" lon="0" rev="0"/>
+            </a:camera>
+            <a:lightRig rig="balanced" dir="t">
+              <a:rot lat="0" lon="0" rev="8700000"/>
+            </a:lightRig>
+          </a:scene3d>
+          <a:sp3d>
+            <a:bevelT w="190500" h="38100"/>
+          </a:sp3d>
+        </p:spPr>
+        <p:style>
+          <a:lnRef idx="2">
+            <a:schemeClr val="accent3">
+              <a:shade val="50000"/>
+            </a:schemeClr>
+          </a:lnRef>
+          <a:fillRef idx="1">
+            <a:schemeClr val="accent3"/>
+          </a:fillRef>
+          <a:effectRef idx="0">
+            <a:schemeClr val="accent3"/>
+          </a:effectRef>
+          <a:fontRef idx="minor">
+            <a:schemeClr val="lt1"/>
+          </a:fontRef>
+        </p:style>
+        <p:txBody>
+          <a:bodyPr rtlCol="0" anchor="ctr"/>
+          <a:lstStyle/>
+          <a:p>
+            <a:pPr algn="ctr"/>
+            <a:endParaRPr lang="en-GB"/>
+          </a:p>
+        </p:txBody>
+      </p:sp>
+      <p:sp>
+        <p:nvSpPr>
+          <p:cNvPr id="8" name="Rectangle 7"/>
+          <p:cNvSpPr/>
+          <p:nvPr/>
+        </p:nvSpPr>
+        <p:spPr>
+          <a:xfrm>
+            <a:off x="4531179" y="3110416"/>
+            <a:ext cx="3347357" cy="395859"/>
+          </a:xfrm>
+          <a:prstGeom prst="rect">
+            <a:avLst/>
+          </a:prstGeom>
+          <a:gradFill flip="none" rotWithShape="1">
+            <a:gsLst>
+              <a:gs pos="0">
+                <a:schemeClr val="accent3">
+                  <a:tint val="66000"/>
+                  <a:satMod val="160000"/>
+                </a:schemeClr>
+              </a:gs>
+              <a:gs pos="50000">
+                <a:schemeClr val="accent3">
+                  <a:tint val="44500"/>
+                  <a:satMod val="160000"/>
+                </a:schemeClr>
+              </a:gs>
+              <a:gs pos="100000">
+                <a:schemeClr val="accent3">
+                  <a:tint val="23500"/>
+                  <a:satMod val="160000"/>
+                </a:schemeClr>
+              </a:gs>
+            </a:gsLst>
+            <a:path path="circle">
+              <a:fillToRect l="50000" t="50000" r="50000" b="50000"/>
+            </a:path>
+            <a:tileRect/>
+          </a:gradFill>
+          <a:ln>
+            <a:noFill/>
+          </a:ln>
+          <a:effectLst/>
+        </p:spPr>
+        <p:style>
+          <a:lnRef idx="2">
+            <a:schemeClr val="accent3">
+              <a:shade val="50000"/>
+            </a:schemeClr>
+          </a:lnRef>
+          <a:fillRef idx="1">
+            <a:schemeClr val="accent3"/>
+          </a:fillRef>
+          <a:effectRef idx="0">
+            <a:schemeClr val="accent3"/>
+          </a:effectRef>
+          <a:fontRef idx="minor">
+            <a:schemeClr val="lt1"/>
+          </a:fontRef>
+        </p:style>
+        <p:txBody>
+          <a:bodyPr rtlCol="0" anchor="ctr"/>
+          <a:lstStyle/>
+          <a:p>
+            <a:pPr algn="ctr"/>
+            <a:endParaRPr lang="en-GB"/>
+          </a:p>
+        </p:txBody>
+      </p:sp>
+      <p:pic>
+        <p:nvPicPr>
+          <p:cNvPr id="42" name="Picture 41"/>
+          <p:cNvPicPr>
+            <a:picLocks noChangeAspect="1"/>
+          </p:cNvPicPr>
+          <p:nvPr/>
+        </p:nvPicPr>
+        <p:blipFill>
+          <a:blip r:embed="rId2">
+            <a:extLst>
+              <a:ext uri="{28A0092B-C50C-407E-A947-70E740481C1C}">
+                <a14:useLocalDpi xmlns:a14="http://schemas.microsoft.com/office/drawing/2010/main" val="0"/>
+              </a:ext>
+            </a:extLst>
+          </a:blip>
+          <a:stretch>
+            <a:fillRect/>
+          </a:stretch>
+        </p:blipFill>
+        <p:spPr>
+          <a:xfrm>
+            <a:off x="1896639" y="1484988"/>
+            <a:ext cx="1556854" cy="613199"/>
+          </a:xfrm>
+          <a:prstGeom prst="rect">
+            <a:avLst/>
+          </a:prstGeom>
+        </p:spPr>
+      </p:pic>
+      <p:pic>
+        <p:nvPicPr>
+          <p:cNvPr id="6" name="Picture 5"/>
+          <p:cNvPicPr>
+            <a:picLocks noChangeAspect="1"/>
+          </p:cNvPicPr>
+          <p:nvPr/>
+        </p:nvPicPr>
+        <p:blipFill>
+          <a:blip r:embed="rId19">
+            <a:extLst>
+              <a:ext uri="{BEBA8EAE-BF5A-486C-A8C5-ECC9F3942E4B}">
+                <a14:imgProps xmlns:a14="http://schemas.microsoft.com/office/drawing/2010/main">
+                  <a14:imgLayer r:embed="rId9">
+                    <a14:imgEffect>
+                      <a14:backgroundRemoval t="0" b="100000" l="0" r="100000">
+                        <a14:foregroundMark x1="12371" y1="24490" x2="5155" y2="24490"/>
+                        <a14:foregroundMark x1="22680" y1="14286" x2="47423" y2="3061"/>
+                        <a14:foregroundMark x1="50515" y1="15306" x2="76289" y2="13265"/>
+                        <a14:foregroundMark x1="73196" y1="6122" x2="98969" y2="33673"/>
+                        <a14:foregroundMark x1="88660" y1="21429" x2="93814" y2="66327"/>
+                        <a14:foregroundMark x1="89691" y1="63265" x2="85567" y2="92857"/>
+                        <a14:foregroundMark x1="73196" y1="89796" x2="41237" y2="97959"/>
+                        <a14:foregroundMark x1="46392" y1="93878" x2="11340" y2="92857"/>
+                        <a14:foregroundMark x1="25773" y1="86735" x2="2062" y2="61224"/>
+                        <a14:foregroundMark x1="21649" y1="23469" x2="31959" y2="2041"/>
+                        <a14:foregroundMark x1="16495" y1="21429" x2="14433" y2="6122"/>
+                        <a14:backgroundMark x1="27835" y1="30612" x2="51546" y2="69388"/>
+                        <a14:backgroundMark x1="62887" y1="33673" x2="76289" y2="57143"/>
+                        <a14:backgroundMark x1="67010" y1="40816" x2="60825" y2="66327"/>
+                        <a14:backgroundMark x1="37113" y1="46939" x2="37113" y2="47959"/>
+                      </a14:backgroundRemoval>
+                    </a14:imgEffect>
+                    <a14:imgEffect>
+                      <a14:artisticPlasticWrap/>
+                    </a14:imgEffect>
+                  </a14:imgLayer>
+                </a14:imgProps>
+              </a:ext>
+              <a:ext uri="{28A0092B-C50C-407E-A947-70E740481C1C}">
+                <a14:useLocalDpi xmlns:a14="http://schemas.microsoft.com/office/drawing/2010/main" val="0"/>
+              </a:ext>
+            </a:extLst>
+          </a:blip>
+          <a:stretch>
+            <a:fillRect/>
+          </a:stretch>
+        </p:blipFill>
+        <p:spPr>
+          <a:xfrm>
+            <a:off x="57800" y="58598"/>
+            <a:ext cx="2150888" cy="2173062"/>
+          </a:xfrm>
+          <a:prstGeom prst="rect">
+            <a:avLst/>
+          </a:prstGeom>
         </p:spPr>
       </p:pic>
     </p:spTree>

</xml_diff>

<commit_message>
Player Sprite Data Sent
Yes
</commit_message>
<xml_diff>
--- a/Assets/GUIMaker.pptx
+++ b/Assets/GUIMaker.pptx
@@ -6,6 +6,7 @@
   </p:sldMasterIdLst>
   <p:sldIdLst>
     <p:sldId id="256" r:id="rId2"/>
+    <p:sldId id="257" r:id="rId3"/>
   </p:sldIdLst>
   <p:sldSz cx="12192000" cy="6858000"/>
   <p:notesSz cx="6858000" cy="9144000"/>
@@ -3712,6 +3713,9 @@
                     <a14:imgEffect>
                       <a14:backgroundRemoval t="10000" b="90000" l="10000" r="90000"/>
                     </a14:imgEffect>
+                    <a14:imgEffect>
+                      <a14:artisticPaintStrokes/>
+                    </a14:imgEffect>
                   </a14:imgLayer>
                 </a14:imgProps>
               </a:ext>
@@ -3720,13 +3724,13 @@
               </a:ext>
             </a:extLst>
           </a:blip>
-          <a:srcRect l="13321" t="12968" r="15512" b="12501"/>
+          <a:srcRect l="13321" t="3131" r="13851" b="12501"/>
           <a:stretch/>
         </p:blipFill>
         <p:spPr bwMode="auto">
           <a:xfrm>
-            <a:off x="568324" y="3222625"/>
-            <a:ext cx="361951" cy="330200"/>
+            <a:off x="5018034" y="4514850"/>
+            <a:ext cx="370395" cy="373781"/>
           </a:xfrm>
           <a:prstGeom prst="rect">
             <a:avLst/>
@@ -4228,6 +4232,74 @@
     <p:extLst>
       <p:ext uri="{BB962C8B-B14F-4D97-AF65-F5344CB8AC3E}">
         <p14:creationId xmlns:p14="http://schemas.microsoft.com/office/powerpoint/2010/main" val="709105818"/>
+      </p:ext>
+    </p:extLst>
+  </p:cSld>
+  <p:clrMapOvr>
+    <a:masterClrMapping/>
+  </p:clrMapOvr>
+</p:sld>
+</file>
+
+<file path=ppt/slides/slide2.xml><?xml version="1.0" encoding="utf-8"?>
+<p:sld xmlns:a="http://schemas.openxmlformats.org/drawingml/2006/main" xmlns:r="http://schemas.openxmlformats.org/officeDocument/2006/relationships" xmlns:p="http://schemas.openxmlformats.org/presentationml/2006/main">
+  <p:cSld>
+    <p:spTree>
+      <p:nvGrpSpPr>
+        <p:cNvPr id="1" name=""/>
+        <p:cNvGrpSpPr/>
+        <p:nvPr/>
+      </p:nvGrpSpPr>
+      <p:grpSpPr>
+        <a:xfrm>
+          <a:off x="0" y="0"/>
+          <a:ext cx="0" cy="0"/>
+          <a:chOff x="0" y="0"/>
+          <a:chExt cx="0" cy="0"/>
+        </a:xfrm>
+      </p:grpSpPr>
+      <p:sp>
+        <p:nvSpPr>
+          <p:cNvPr id="2" name="Title 1"/>
+          <p:cNvSpPr>
+            <a:spLocks noGrp="1"/>
+          </p:cNvSpPr>
+          <p:nvPr>
+            <p:ph type="title"/>
+          </p:nvPr>
+        </p:nvSpPr>
+        <p:spPr/>
+        <p:txBody>
+          <a:bodyPr/>
+          <a:lstStyle/>
+          <a:p>
+            <a:endParaRPr lang="en-GB"/>
+          </a:p>
+        </p:txBody>
+      </p:sp>
+      <p:sp>
+        <p:nvSpPr>
+          <p:cNvPr id="3" name="Content Placeholder 2"/>
+          <p:cNvSpPr>
+            <a:spLocks noGrp="1"/>
+          </p:cNvSpPr>
+          <p:nvPr>
+            <p:ph idx="1"/>
+          </p:nvPr>
+        </p:nvSpPr>
+        <p:spPr/>
+        <p:txBody>
+          <a:bodyPr/>
+          <a:lstStyle/>
+          <a:p>
+            <a:endParaRPr lang="en-GB"/>
+          </a:p>
+        </p:txBody>
+      </p:sp>
+    </p:spTree>
+    <p:extLst>
+      <p:ext uri="{BB962C8B-B14F-4D97-AF65-F5344CB8AC3E}">
+        <p14:creationId xmlns:p14="http://schemas.microsoft.com/office/powerpoint/2010/main" val="790430131"/>
       </p:ext>
     </p:extLst>
   </p:cSld>

</xml_diff>